<commit_message>
Updated Presentation and Documentation
</commit_message>
<xml_diff>
--- a/presentation/Up and Coming Video Games - Full Presentation.pptx
+++ b/presentation/Up and Coming Video Games - Full Presentation.pptx
@@ -22,7 +22,7 @@
     <p:sldId id="278" r:id="rId13"/>
     <p:sldId id="280" r:id="rId14"/>
     <p:sldId id="281" r:id="rId15"/>
-    <p:sldId id="275" r:id="rId16"/>
+    <p:sldId id="283" r:id="rId16"/>
     <p:sldId id="277" r:id="rId17"/>
     <p:sldId id="282" r:id="rId18"/>
   </p:sldIdLst>
@@ -1338,17 +1338,23 @@
               <a:t>Tableau link: </a:t>
             </a:r>
             <a:r>
-              <a:rPr lang="en-US" u="sng" dirty="0">
-                <a:solidFill>
-                  <a:schemeClr val="hlink"/>
-                </a:solidFill>
+              <a:rPr lang="en-US" dirty="0">
                 <a:hlinkClick r:id="rId3"/>
               </a:rPr>
-              <a:t>https://public.tableau.com/profile/eva.fuentes.lopez#!/vizhome/UpComingVideoGames/Story1?publish=yes</a:t>
+              <a:t>https://public.tableau.com/profile/eva.fuentes.lopez#!/vizhome/UCB_Storyboard_Dashboard/UpandComingVideoGames?publish=yes</a:t>
             </a:r>
             <a:endParaRPr lang="en-US" dirty="0"/>
           </a:p>
           <a:p>
+            <a:pPr marL="0" lvl="0" indent="0" algn="l" rtl="0">
+              <a:spcBef>
+                <a:spcPts val="0"/>
+              </a:spcBef>
+              <a:spcAft>
+                <a:spcPts val="0"/>
+              </a:spcAft>
+              <a:buNone/>
+            </a:pPr>
             <a:endParaRPr lang="en-US" dirty="0"/>
           </a:p>
           <a:p>
@@ -1466,259 +1472,354 @@
           </a:bodyPr>
           <a:lstStyle/>
           <a:p>
-            <a:pPr marL="0" lvl="0" indent="0" algn="l" rtl="0">
-              <a:spcBef>
-                <a:spcPts val="0"/>
-              </a:spcBef>
-              <a:spcAft>
-                <a:spcPts val="0"/>
-              </a:spcAft>
-              <a:buNone/>
-            </a:pPr>
-            <a:r>
-              <a:rPr lang="en" dirty="0"/>
-              <a:t>Speaker Notes: *** Brief explanation </a:t>
-            </a:r>
-            <a:endParaRPr dirty="0"/>
-          </a:p>
-          <a:p>
-            <a:pPr marL="0" lvl="0" indent="0" algn="l" rtl="0">
-              <a:spcBef>
-                <a:spcPts val="0"/>
-              </a:spcBef>
-              <a:spcAft>
-                <a:spcPts val="0"/>
-              </a:spcAft>
-              <a:buNone/>
-            </a:pPr>
-            <a:r>
-              <a:rPr lang="en" dirty="0"/>
-              <a:t>	Need process of:</a:t>
-            </a:r>
-            <a:endParaRPr dirty="0"/>
-          </a:p>
-          <a:p>
-            <a:pPr marL="914400" lvl="0" indent="-298450" algn="l" rtl="0">
-              <a:spcBef>
-                <a:spcPts val="0"/>
-              </a:spcBef>
-              <a:spcAft>
-                <a:spcPts val="0"/>
-              </a:spcAft>
-              <a:buSzPts val="1100"/>
-              <a:buChar char="-"/>
-            </a:pPr>
-            <a:r>
-              <a:rPr lang="en" dirty="0"/>
-              <a:t>How we built our model based on our 70 cut-off</a:t>
-            </a:r>
-            <a:endParaRPr dirty="0"/>
-          </a:p>
-          <a:p>
-            <a:pPr marL="914400" lvl="0" indent="-298450" algn="l" rtl="0">
-              <a:spcBef>
-                <a:spcPts val="0"/>
-              </a:spcBef>
-              <a:spcAft>
-                <a:spcPts val="0"/>
-              </a:spcAft>
-              <a:buSzPts val="1100"/>
-              <a:buChar char="-"/>
-            </a:pPr>
-            <a:r>
-              <a:rPr lang="en" dirty="0"/>
+            <a:pPr rtl="0"/>
+            <a:r>
+              <a:rPr lang="en-US" sz="1100" b="0" i="0" u="none" strike="noStrike" cap="none" dirty="0">
+                <a:solidFill>
+                  <a:srgbClr val="000000"/>
+                </a:solidFill>
+                <a:effectLst/>
+                <a:latin typeface="Arial"/>
+                <a:ea typeface="Arial"/>
+                <a:cs typeface="Arial"/>
+                <a:sym typeface="Arial"/>
+              </a:rPr>
+              <a:t>How we built our model based on our 75 cut-off? </a:t>
+            </a:r>
+          </a:p>
+          <a:p>
+            <a:pPr lvl="1" rtl="0" fontAlgn="base"/>
+            <a:r>
+              <a:rPr lang="en-US" sz="1100" b="1" i="0" u="none" strike="noStrike" cap="none" dirty="0">
+                <a:solidFill>
+                  <a:srgbClr val="000000"/>
+                </a:solidFill>
+                <a:effectLst/>
+                <a:latin typeface="Arial"/>
+                <a:ea typeface="Arial"/>
+                <a:cs typeface="Arial"/>
+                <a:sym typeface="Arial"/>
+              </a:rPr>
+              <a:t>As a group we decided to use bins in order to classify the </a:t>
+            </a:r>
+            <a:r>
+              <a:rPr lang="en-US" sz="1100" b="1" i="0" u="none" strike="noStrike" cap="none" dirty="0" err="1">
+                <a:solidFill>
+                  <a:srgbClr val="000000"/>
+                </a:solidFill>
+                <a:effectLst/>
+                <a:latin typeface="Arial"/>
+                <a:ea typeface="Arial"/>
+                <a:cs typeface="Arial"/>
+                <a:sym typeface="Arial"/>
+              </a:rPr>
+              <a:t>percent_positive_reviews</a:t>
+            </a:r>
+            <a:r>
+              <a:rPr lang="en-US" sz="1100" b="1" i="0" u="none" strike="noStrike" cap="none" dirty="0">
+                <a:solidFill>
+                  <a:srgbClr val="000000"/>
+                </a:solidFill>
+                <a:effectLst/>
+                <a:latin typeface="Arial"/>
+                <a:ea typeface="Arial"/>
+                <a:cs typeface="Arial"/>
+                <a:sym typeface="Arial"/>
+              </a:rPr>
+              <a:t> column. If a game was above a rating of 75 it was classified as popular and given a variable of “1”. If a game was below a rating of 75, it was classified as unpopular and given a variable of “0”. </a:t>
+            </a:r>
+          </a:p>
+          <a:p>
+            <a:pPr lvl="1" rtl="0" fontAlgn="base"/>
+            <a:endParaRPr lang="en-US" sz="1100" b="1" i="0" u="none" strike="noStrike" cap="none" dirty="0">
+              <a:solidFill>
+                <a:srgbClr val="000000"/>
+              </a:solidFill>
+              <a:effectLst/>
+              <a:latin typeface="Arial"/>
+              <a:ea typeface="Arial"/>
+              <a:cs typeface="Arial"/>
+              <a:sym typeface="Arial"/>
+            </a:endParaRPr>
+          </a:p>
+          <a:p>
+            <a:pPr rtl="0" fontAlgn="base"/>
+            <a:r>
+              <a:rPr lang="en-US" sz="1100" b="0" i="0" u="none" strike="noStrike" cap="none" dirty="0">
+                <a:solidFill>
+                  <a:srgbClr val="000000"/>
+                </a:solidFill>
+                <a:effectLst/>
+                <a:latin typeface="Arial"/>
+                <a:ea typeface="Arial"/>
+                <a:cs typeface="Arial"/>
+                <a:sym typeface="Arial"/>
+              </a:rPr>
               <a:t>What type of model we used</a:t>
             </a:r>
-            <a:endParaRPr dirty="0"/>
-          </a:p>
-          <a:p>
-            <a:pPr marL="914400" lvl="0" indent="-298450" algn="l" rtl="0">
-              <a:spcBef>
-                <a:spcPts val="0"/>
-              </a:spcBef>
-              <a:spcAft>
-                <a:spcPts val="0"/>
-              </a:spcAft>
-              <a:buSzPts val="1100"/>
-              <a:buChar char="-"/>
-            </a:pPr>
-            <a:r>
-              <a:rPr lang="en" dirty="0"/>
+          </a:p>
+          <a:p>
+            <a:pPr lvl="1" rtl="0" fontAlgn="base"/>
+            <a:r>
+              <a:rPr lang="en-US" sz="1100" b="1" i="0" u="none" strike="noStrike" cap="none" dirty="0">
+                <a:solidFill>
+                  <a:srgbClr val="000000"/>
+                </a:solidFill>
+                <a:effectLst/>
+                <a:latin typeface="Arial"/>
+                <a:ea typeface="Arial"/>
+                <a:cs typeface="Arial"/>
+                <a:sym typeface="Arial"/>
+              </a:rPr>
+              <a:t>After creating the classification column, we decided to use a Logistic Regression model. The Logistic Regression model proved to be a beneficial model to run because of its simplicity in giving us binary outcomes, either a game would be classified as popular or unpopular. </a:t>
+            </a:r>
+          </a:p>
+          <a:p>
+            <a:pPr lvl="1" rtl="0" fontAlgn="base"/>
+            <a:endParaRPr lang="en-US" sz="1100" b="1" i="0" u="none" strike="noStrike" cap="none" dirty="0">
+              <a:solidFill>
+                <a:srgbClr val="000000"/>
+              </a:solidFill>
+              <a:effectLst/>
+              <a:latin typeface="Arial"/>
+              <a:ea typeface="Arial"/>
+              <a:cs typeface="Arial"/>
+              <a:sym typeface="Arial"/>
+            </a:endParaRPr>
+          </a:p>
+          <a:p>
+            <a:pPr rtl="0" fontAlgn="base"/>
+            <a:r>
+              <a:rPr lang="en-US" sz="1100" b="0" i="0" u="none" strike="noStrike" cap="none" dirty="0">
+                <a:solidFill>
+                  <a:srgbClr val="000000"/>
+                </a:solidFill>
+                <a:effectLst/>
+                <a:latin typeface="Arial"/>
+                <a:ea typeface="Arial"/>
+                <a:cs typeface="Arial"/>
+                <a:sym typeface="Arial"/>
+              </a:rPr>
               <a:t>What accuracy scores we got</a:t>
             </a:r>
-            <a:endParaRPr dirty="0"/>
-          </a:p>
-          <a:p>
-            <a:pPr marL="914400" lvl="0" indent="-298450" algn="l" rtl="0">
-              <a:spcBef>
-                <a:spcPts val="0"/>
-              </a:spcBef>
-              <a:spcAft>
-                <a:spcPts val="0"/>
-              </a:spcAft>
-              <a:buSzPts val="1100"/>
-              <a:buChar char="-"/>
-            </a:pPr>
-            <a:r>
-              <a:rPr lang="en" dirty="0"/>
-              <a:t>How the model changed based on results</a:t>
-            </a:r>
-            <a:endParaRPr dirty="0"/>
-          </a:p>
-          <a:p>
-            <a:pPr marL="914400" lvl="0" indent="-298450" algn="l" rtl="0">
-              <a:spcBef>
-                <a:spcPts val="0"/>
-              </a:spcBef>
-              <a:spcAft>
-                <a:spcPts val="0"/>
-              </a:spcAft>
-              <a:buSzPts val="1100"/>
-              <a:buChar char="-"/>
-            </a:pPr>
-            <a:r>
-              <a:rPr lang="en" dirty="0"/>
-              <a:t>If the model changed further, changed markers for training</a:t>
-            </a:r>
-            <a:endParaRPr dirty="0"/>
-          </a:p>
-          <a:p>
-            <a:pPr marL="914400" lvl="0" indent="-298450" algn="l" rtl="0">
-              <a:spcBef>
-                <a:spcPts val="0"/>
-              </a:spcBef>
-              <a:spcAft>
-                <a:spcPts val="0"/>
-              </a:spcAft>
-              <a:buSzPts val="1100"/>
-              <a:buChar char="-"/>
-            </a:pPr>
-            <a:r>
-              <a:rPr lang="en" dirty="0"/>
-              <a:t>Any visuals/reports of our models and accuracy score(s) </a:t>
-            </a:r>
-            <a:endParaRPr dirty="0"/>
-          </a:p>
-          <a:p>
-            <a:pPr marL="0" lvl="0" indent="0" algn="l" rtl="0">
-              <a:spcBef>
-                <a:spcPts val="0"/>
-              </a:spcBef>
-              <a:spcAft>
-                <a:spcPts val="0"/>
-              </a:spcAft>
-              <a:buNone/>
-            </a:pPr>
-            <a:endParaRPr dirty="0"/>
-          </a:p>
-          <a:p>
-            <a:pPr marL="0" lvl="0" indent="0" algn="l" rtl="0">
-              <a:spcBef>
-                <a:spcPts val="0"/>
-              </a:spcBef>
-              <a:spcAft>
-                <a:spcPts val="0"/>
-              </a:spcAft>
-              <a:buNone/>
-            </a:pPr>
-            <a:r>
-              <a:rPr lang="en" dirty="0"/>
-              <a:t>	Tools used: </a:t>
-            </a:r>
-            <a:endParaRPr dirty="0"/>
-          </a:p>
-          <a:p>
-            <a:pPr marL="0" lvl="0" indent="0" algn="l" rtl="0">
-              <a:spcBef>
-                <a:spcPts val="0"/>
-              </a:spcBef>
-              <a:spcAft>
-                <a:spcPts val="0"/>
-              </a:spcAft>
-              <a:buNone/>
-            </a:pPr>
-            <a:endParaRPr dirty="0"/>
-          </a:p>
-          <a:p>
-            <a:pPr marL="0" lvl="0" indent="0" algn="l" rtl="0">
-              <a:spcBef>
-                <a:spcPts val="0"/>
-              </a:spcBef>
-              <a:spcAft>
-                <a:spcPts val="0"/>
-              </a:spcAft>
-              <a:buNone/>
-            </a:pPr>
-            <a:r>
-              <a:rPr lang="en" dirty="0"/>
-              <a:t>	Algorithms used: </a:t>
-            </a:r>
-          </a:p>
-          <a:p>
-            <a:pPr marL="0" lvl="0" indent="0" algn="l" rtl="0">
-              <a:spcBef>
-                <a:spcPts val="0"/>
-              </a:spcBef>
-              <a:spcAft>
-                <a:spcPts val="0"/>
-              </a:spcAft>
-              <a:buNone/>
-            </a:pPr>
-            <a:endParaRPr lang="en" dirty="0"/>
-          </a:p>
-          <a:p>
-            <a:pPr marL="0" lvl="0" indent="0" algn="l" rtl="0">
-              <a:spcBef>
-                <a:spcPts val="0"/>
-              </a:spcBef>
-              <a:spcAft>
-                <a:spcPts val="0"/>
-              </a:spcAft>
-              <a:buNone/>
-            </a:pPr>
-            <a:r>
-              <a:rPr lang="en-US" dirty="0"/>
-              <a:t>Write about features of accuracy from machine learning and </a:t>
-            </a:r>
-          </a:p>
-          <a:p>
-            <a:pPr marL="0" lvl="0" indent="0" algn="l" rtl="0">
-              <a:spcBef>
-                <a:spcPts val="0"/>
-              </a:spcBef>
-              <a:spcAft>
-                <a:spcPts val="0"/>
-              </a:spcAft>
-              <a:buNone/>
-            </a:pPr>
-            <a:endParaRPr lang="en-US" dirty="0"/>
-          </a:p>
-          <a:p>
-            <a:pPr marL="0" lvl="0" indent="0" algn="l" rtl="0">
-              <a:spcBef>
-                <a:spcPts val="0"/>
-              </a:spcBef>
-              <a:spcAft>
-                <a:spcPts val="0"/>
-              </a:spcAft>
-              <a:buNone/>
-            </a:pPr>
-            <a:r>
-              <a:rPr lang="en-US" dirty="0"/>
-              <a:t>What we felt that we have achieved in this process, condition metrics (what we found to answer the questions), etc. </a:t>
-            </a:r>
-          </a:p>
-          <a:p>
-            <a:pPr marL="0" lvl="0" indent="0" algn="l" rtl="0">
-              <a:spcBef>
-                <a:spcPts val="0"/>
-              </a:spcBef>
-              <a:spcAft>
-                <a:spcPts val="0"/>
-              </a:spcAft>
-              <a:buNone/>
-            </a:pPr>
-            <a:endParaRPr dirty="0"/>
+          </a:p>
+          <a:p>
+            <a:pPr lvl="1" rtl="0" fontAlgn="base"/>
+            <a:r>
+              <a:rPr lang="en-US" sz="1100" b="1" i="0" u="none" strike="noStrike" cap="none" dirty="0">
+                <a:solidFill>
+                  <a:srgbClr val="000000"/>
+                </a:solidFill>
+                <a:effectLst/>
+                <a:latin typeface="Arial"/>
+                <a:ea typeface="Arial"/>
+                <a:cs typeface="Arial"/>
+                <a:sym typeface="Arial"/>
+              </a:rPr>
+              <a:t>For the Logistic Regression Model with the popular tags being used as our features, we got an accuracy score of about 73%. For the logistic regression model with the features being the Genre, we got an accuracy score of 70%. </a:t>
+            </a:r>
+          </a:p>
+          <a:p>
+            <a:pPr lvl="1" rtl="0" fontAlgn="base"/>
+            <a:endParaRPr lang="en-US" sz="1100" b="1" i="0" u="none" strike="noStrike" cap="none" dirty="0">
+              <a:solidFill>
+                <a:srgbClr val="000000"/>
+              </a:solidFill>
+              <a:effectLst/>
+              <a:latin typeface="Arial"/>
+              <a:ea typeface="Arial"/>
+              <a:cs typeface="Arial"/>
+              <a:sym typeface="Arial"/>
+            </a:endParaRPr>
+          </a:p>
+          <a:p>
+            <a:pPr rtl="0" fontAlgn="base"/>
+            <a:r>
+              <a:rPr lang="en-US" sz="1100" b="0" i="0" u="none" strike="noStrike" cap="none" dirty="0">
+                <a:solidFill>
+                  <a:srgbClr val="000000"/>
+                </a:solidFill>
+                <a:effectLst/>
+                <a:latin typeface="Arial"/>
+                <a:ea typeface="Arial"/>
+                <a:cs typeface="Arial"/>
+                <a:sym typeface="Arial"/>
+              </a:rPr>
+              <a:t>What are some limitations to the Logistic Regression Model? </a:t>
+            </a:r>
+          </a:p>
+          <a:p>
+            <a:pPr lvl="1" rtl="0" fontAlgn="base"/>
+            <a:r>
+              <a:rPr lang="en-US" sz="1100" b="1" i="0" u="none" strike="noStrike" cap="none" dirty="0">
+                <a:solidFill>
+                  <a:srgbClr val="000000"/>
+                </a:solidFill>
+                <a:effectLst/>
+                <a:latin typeface="Arial"/>
+                <a:ea typeface="Arial"/>
+                <a:cs typeface="Arial"/>
+                <a:sym typeface="Arial"/>
+              </a:rPr>
+              <a:t>One limitation that stands out about the Logistic Regression Model is the fact that there is a possibility for overfitting. For example, a game that was predicted popular based on its popular tags and </a:t>
+            </a:r>
+            <a:r>
+              <a:rPr lang="en-US" sz="1100" b="1" i="0" u="none" strike="noStrike" cap="none" dirty="0" err="1">
+                <a:solidFill>
+                  <a:srgbClr val="000000"/>
+                </a:solidFill>
+                <a:effectLst/>
+                <a:latin typeface="Arial"/>
+                <a:ea typeface="Arial"/>
+                <a:cs typeface="Arial"/>
+                <a:sym typeface="Arial"/>
+              </a:rPr>
+              <a:t>percent_positive_reviews</a:t>
+            </a:r>
+            <a:r>
+              <a:rPr lang="en-US" sz="1100" b="1" i="0" u="none" strike="noStrike" cap="none" dirty="0">
+                <a:solidFill>
+                  <a:srgbClr val="000000"/>
+                </a:solidFill>
+                <a:effectLst/>
+                <a:latin typeface="Arial"/>
+                <a:ea typeface="Arial"/>
+                <a:cs typeface="Arial"/>
+                <a:sym typeface="Arial"/>
+              </a:rPr>
+              <a:t> in reality may not actually be a popular game. </a:t>
+            </a:r>
+          </a:p>
+          <a:p>
+            <a:pPr lvl="1" rtl="0" fontAlgn="base"/>
+            <a:endParaRPr lang="en-US" sz="1100" b="1" i="0" u="none" strike="noStrike" cap="none" dirty="0">
+              <a:solidFill>
+                <a:srgbClr val="000000"/>
+              </a:solidFill>
+              <a:effectLst/>
+              <a:latin typeface="Arial"/>
+              <a:ea typeface="Arial"/>
+              <a:cs typeface="Arial"/>
+              <a:sym typeface="Arial"/>
+            </a:endParaRPr>
+          </a:p>
+          <a:p>
+            <a:pPr rtl="0" fontAlgn="base"/>
+            <a:r>
+              <a:rPr lang="en-US" sz="1100" b="0" i="0" u="none" strike="noStrike" cap="none" dirty="0">
+                <a:solidFill>
+                  <a:srgbClr val="000000"/>
+                </a:solidFill>
+                <a:effectLst/>
+                <a:latin typeface="Arial"/>
+                <a:ea typeface="Arial"/>
+                <a:cs typeface="Arial"/>
+                <a:sym typeface="Arial"/>
+              </a:rPr>
+              <a:t>What could we have done differently for the Machine Learning process? </a:t>
+            </a:r>
+          </a:p>
+          <a:p>
+            <a:pPr lvl="1" rtl="0" fontAlgn="base"/>
+            <a:r>
+              <a:rPr lang="en-US" sz="1100" b="1" i="0" u="none" strike="noStrike" cap="none" dirty="0">
+                <a:solidFill>
+                  <a:srgbClr val="000000"/>
+                </a:solidFill>
+                <a:effectLst/>
+                <a:latin typeface="Arial"/>
+                <a:ea typeface="Arial"/>
+                <a:cs typeface="Arial"/>
+                <a:sym typeface="Arial"/>
+              </a:rPr>
+              <a:t>One potential issue with our Machine Learning model has to do with the target column. For the </a:t>
+            </a:r>
+            <a:r>
+              <a:rPr lang="en-US" sz="1100" b="1" i="0" u="none" strike="noStrike" cap="none" dirty="0" err="1">
+                <a:solidFill>
+                  <a:srgbClr val="000000"/>
+                </a:solidFill>
+                <a:effectLst/>
+                <a:latin typeface="Arial"/>
+                <a:ea typeface="Arial"/>
+                <a:cs typeface="Arial"/>
+                <a:sym typeface="Arial"/>
+              </a:rPr>
+              <a:t>percent_positive_reviews</a:t>
+            </a:r>
+            <a:r>
+              <a:rPr lang="en-US" sz="1100" b="1" i="0" u="none" strike="noStrike" cap="none" dirty="0">
+                <a:solidFill>
+                  <a:srgbClr val="000000"/>
+                </a:solidFill>
+                <a:effectLst/>
+                <a:latin typeface="Arial"/>
+                <a:ea typeface="Arial"/>
+                <a:cs typeface="Arial"/>
+                <a:sym typeface="Arial"/>
+              </a:rPr>
+              <a:t> column, each game had a different amount of total reviews. Some games had a significant amount of reviews while others did not have nearly as much.</a:t>
+            </a:r>
+          </a:p>
+          <a:p>
+            <a:pPr marL="615950" lvl="1" indent="0" rtl="0" fontAlgn="base">
+              <a:buNone/>
+            </a:pPr>
+            <a:endParaRPr lang="en-US" sz="1100" b="1" i="0" u="none" strike="noStrike" cap="none" dirty="0">
+              <a:solidFill>
+                <a:srgbClr val="000000"/>
+              </a:solidFill>
+              <a:effectLst/>
+              <a:latin typeface="Arial"/>
+              <a:ea typeface="Arial"/>
+              <a:cs typeface="Arial"/>
+              <a:sym typeface="Arial"/>
+            </a:endParaRPr>
+          </a:p>
+          <a:p>
+            <a:pPr lvl="0" rtl="0" fontAlgn="base"/>
+            <a:r>
+              <a:rPr lang="en-US" sz="1100" b="1" i="0" u="none" strike="noStrike" cap="none" dirty="0">
+                <a:solidFill>
+                  <a:srgbClr val="000000"/>
+                </a:solidFill>
+                <a:effectLst/>
+                <a:latin typeface="Arial"/>
+                <a:ea typeface="Arial"/>
+                <a:cs typeface="Arial"/>
+                <a:sym typeface="Arial"/>
+              </a:rPr>
+              <a:t>Tools used: Pandas, </a:t>
+            </a:r>
+            <a:r>
+              <a:rPr lang="en-US" sz="1100" b="1" i="0" u="none" strike="noStrike" cap="none" dirty="0" err="1">
+                <a:solidFill>
+                  <a:srgbClr val="000000"/>
+                </a:solidFill>
+                <a:effectLst/>
+                <a:latin typeface="Arial"/>
+                <a:ea typeface="Arial"/>
+                <a:cs typeface="Arial"/>
+                <a:sym typeface="Arial"/>
+              </a:rPr>
+              <a:t>Sklearn</a:t>
+            </a:r>
+            <a:r>
+              <a:rPr lang="en-US" sz="1100" b="1" i="0" u="none" strike="noStrike" cap="none" dirty="0">
+                <a:solidFill>
+                  <a:srgbClr val="000000"/>
+                </a:solidFill>
+                <a:effectLst/>
+                <a:latin typeface="Arial"/>
+                <a:ea typeface="Arial"/>
+                <a:cs typeface="Arial"/>
+                <a:sym typeface="Arial"/>
+              </a:rPr>
+              <a:t> </a:t>
+            </a:r>
+            <a:endParaRPr lang="en-US" b="0" dirty="0">
+              <a:effectLst/>
+            </a:endParaRPr>
           </a:p>
         </p:txBody>
       </p:sp>
@@ -4336,110 +4437,6 @@
       <p:sp>
         <p:nvSpPr>
           <p:cNvPr id="18" name="Google Shape;18;p2"/>
-          <p:cNvSpPr txBox="1">
-            <a:spLocks noGrp="1"/>
-          </p:cNvSpPr>
-          <p:nvPr>
-            <p:ph type="sldNum" idx="12"/>
-          </p:nvPr>
-        </p:nvSpPr>
-        <p:spPr>
-          <a:xfrm>
-            <a:off x="8472458" y="4663217"/>
-            <a:ext cx="548700" cy="393600"/>
-          </a:xfrm>
-          <a:prstGeom prst="rect">
-            <a:avLst/>
-          </a:prstGeom>
-        </p:spPr>
-        <p:txBody>
-          <a:bodyPr spcFirstLastPara="1" wrap="square" lIns="91425" tIns="91425" rIns="91425" bIns="91425" anchor="ctr" anchorCtr="0">
-            <a:noAutofit/>
-          </a:bodyPr>
-          <a:lstStyle>
-            <a:lvl1pPr lvl="0">
-              <a:buNone/>
-              <a:defRPr/>
-            </a:lvl1pPr>
-            <a:lvl2pPr lvl="1">
-              <a:buNone/>
-              <a:defRPr/>
-            </a:lvl2pPr>
-            <a:lvl3pPr lvl="2">
-              <a:buNone/>
-              <a:defRPr/>
-            </a:lvl3pPr>
-            <a:lvl4pPr lvl="3">
-              <a:buNone/>
-              <a:defRPr/>
-            </a:lvl4pPr>
-            <a:lvl5pPr lvl="4">
-              <a:buNone/>
-              <a:defRPr/>
-            </a:lvl5pPr>
-            <a:lvl6pPr lvl="5">
-              <a:buNone/>
-              <a:defRPr/>
-            </a:lvl6pPr>
-            <a:lvl7pPr lvl="6">
-              <a:buNone/>
-              <a:defRPr/>
-            </a:lvl7pPr>
-            <a:lvl8pPr lvl="7">
-              <a:buNone/>
-              <a:defRPr/>
-            </a:lvl8pPr>
-            <a:lvl9pPr lvl="8">
-              <a:buNone/>
-              <a:defRPr/>
-            </a:lvl9pPr>
-          </a:lstStyle>
-          <a:p>
-            <a:pPr marL="0" lvl="0" indent="0" algn="r" rtl="0">
-              <a:spcBef>
-                <a:spcPts val="0"/>
-              </a:spcBef>
-              <a:spcAft>
-                <a:spcPts val="0"/>
-              </a:spcAft>
-              <a:buNone/>
-            </a:pPr>
-            <a:fld id="{00000000-1234-1234-1234-123412341234}" type="slidenum">
-              <a:rPr lang="en"/>
-              <a:t>‹#›</a:t>
-            </a:fld>
-            <a:endParaRPr/>
-          </a:p>
-        </p:txBody>
-      </p:sp>
-    </p:spTree>
-  </p:cSld>
-  <p:clrMapOvr>
-    <a:masterClrMapping/>
-  </p:clrMapOvr>
-</p:sldLayout>
-</file>
-
-<file path=ppt/slideLayouts/slideLayout10.xml><?xml version="1.0" encoding="utf-8"?>
-<p:sldLayout xmlns:a="http://schemas.openxmlformats.org/drawingml/2006/main" xmlns:r="http://schemas.openxmlformats.org/officeDocument/2006/relationships" xmlns:p="http://schemas.openxmlformats.org/presentationml/2006/main" matchingName="Blank" type="blank">
-  <p:cSld name="BLANK">
-    <p:spTree>
-      <p:nvGrpSpPr>
-        <p:cNvPr id="1" name="Shape 128"/>
-        <p:cNvGrpSpPr/>
-        <p:nvPr/>
-      </p:nvGrpSpPr>
-      <p:grpSpPr>
-        <a:xfrm>
-          <a:off x="0" y="0"/>
-          <a:ext cx="0" cy="0"/>
-          <a:chOff x="0" y="0"/>
-          <a:chExt cx="0" cy="0"/>
-        </a:xfrm>
-      </p:grpSpPr>
-      <p:sp>
-        <p:nvSpPr>
-          <p:cNvPr id="129" name="Google Shape;129;p12"/>
           <p:cNvSpPr txBox="1">
             <a:spLocks noGrp="1"/>
           </p:cNvSpPr>
@@ -6612,338 +6609,6 @@
 </file>
 
 <file path=ppt/slideLayouts/slideLayout5.xml><?xml version="1.0" encoding="utf-8"?>
-<p:sldLayout xmlns:a="http://schemas.openxmlformats.org/drawingml/2006/main" xmlns:r="http://schemas.openxmlformats.org/officeDocument/2006/relationships" xmlns:p="http://schemas.openxmlformats.org/presentationml/2006/main" matchingName="Title only" type="titleOnly">
-  <p:cSld name="TITLE_ONLY">
-    <p:spTree>
-      <p:nvGrpSpPr>
-        <p:cNvPr id="1" name="Shape 56"/>
-        <p:cNvGrpSpPr/>
-        <p:nvPr/>
-      </p:nvGrpSpPr>
-      <p:grpSpPr>
-        <a:xfrm>
-          <a:off x="0" y="0"/>
-          <a:ext cx="0" cy="0"/>
-          <a:chOff x="0" y="0"/>
-          <a:chExt cx="0" cy="0"/>
-        </a:xfrm>
-      </p:grpSpPr>
-      <p:grpSp>
-        <p:nvGrpSpPr>
-          <p:cNvPr id="57" name="Google Shape;57;p6"/>
-          <p:cNvGrpSpPr/>
-          <p:nvPr/>
-        </p:nvGrpSpPr>
-        <p:grpSpPr>
-          <a:xfrm>
-            <a:off x="0" y="381001"/>
-            <a:ext cx="1037850" cy="1016287"/>
-            <a:chOff x="0" y="381001"/>
-            <a:chExt cx="1037850" cy="1016287"/>
-          </a:xfrm>
-        </p:grpSpPr>
-        <p:sp>
-          <p:nvSpPr>
-            <p:cNvPr id="58" name="Google Shape;58;p6"/>
-            <p:cNvSpPr/>
-            <p:nvPr/>
-          </p:nvSpPr>
-          <p:spPr>
-            <a:xfrm rot="-5400000">
-              <a:off x="0" y="381001"/>
-              <a:ext cx="808800" cy="808800"/>
-            </a:xfrm>
-            <a:prstGeom prst="diagStripe">
-              <a:avLst>
-                <a:gd name="adj" fmla="val 50000"/>
-              </a:avLst>
-            </a:prstGeom>
-            <a:solidFill>
-              <a:schemeClr val="accent1"/>
-            </a:solidFill>
-            <a:ln>
-              <a:noFill/>
-            </a:ln>
-          </p:spPr>
-          <p:txBody>
-            <a:bodyPr spcFirstLastPara="1" wrap="square" lIns="91425" tIns="91425" rIns="91425" bIns="91425" anchor="ctr" anchorCtr="0">
-              <a:noAutofit/>
-            </a:bodyPr>
-            <a:lstStyle/>
-            <a:p>
-              <a:pPr marL="0" lvl="0" indent="0" algn="l" rtl="0">
-                <a:spcBef>
-                  <a:spcPts val="0"/>
-                </a:spcBef>
-                <a:spcAft>
-                  <a:spcPts val="0"/>
-                </a:spcAft>
-                <a:buNone/>
-              </a:pPr>
-              <a:endParaRPr/>
-            </a:p>
-          </p:txBody>
-        </p:sp>
-        <p:sp>
-          <p:nvSpPr>
-            <p:cNvPr id="59" name="Google Shape;59;p6"/>
-            <p:cNvSpPr/>
-            <p:nvPr/>
-          </p:nvSpPr>
-          <p:spPr>
-            <a:xfrm flipH="1">
-              <a:off x="229050" y="588489"/>
-              <a:ext cx="808800" cy="808800"/>
-            </a:xfrm>
-            <a:prstGeom prst="diagStripe">
-              <a:avLst>
-                <a:gd name="adj" fmla="val 50000"/>
-              </a:avLst>
-            </a:prstGeom>
-            <a:solidFill>
-              <a:schemeClr val="lt2"/>
-            </a:solidFill>
-            <a:ln>
-              <a:noFill/>
-            </a:ln>
-          </p:spPr>
-          <p:txBody>
-            <a:bodyPr spcFirstLastPara="1" wrap="square" lIns="91425" tIns="91425" rIns="91425" bIns="91425" anchor="ctr" anchorCtr="0">
-              <a:noAutofit/>
-            </a:bodyPr>
-            <a:lstStyle/>
-            <a:p>
-              <a:pPr marL="0" lvl="0" indent="0" algn="l" rtl="0">
-                <a:spcBef>
-                  <a:spcPts val="0"/>
-                </a:spcBef>
-                <a:spcAft>
-                  <a:spcPts val="0"/>
-                </a:spcAft>
-                <a:buNone/>
-              </a:pPr>
-              <a:endParaRPr/>
-            </a:p>
-          </p:txBody>
-        </p:sp>
-      </p:grpSp>
-      <p:sp>
-        <p:nvSpPr>
-          <p:cNvPr id="60" name="Google Shape;60;p6"/>
-          <p:cNvSpPr txBox="1">
-            <a:spLocks noGrp="1"/>
-          </p:cNvSpPr>
-          <p:nvPr>
-            <p:ph type="title"/>
-          </p:nvPr>
-        </p:nvSpPr>
-        <p:spPr>
-          <a:xfrm>
-            <a:off x="1297500" y="393750"/>
-            <a:ext cx="7038900" cy="914100"/>
-          </a:xfrm>
-          <a:prstGeom prst="rect">
-            <a:avLst/>
-          </a:prstGeom>
-        </p:spPr>
-        <p:txBody>
-          <a:bodyPr spcFirstLastPara="1" wrap="square" lIns="91425" tIns="91425" rIns="91425" bIns="91425" anchor="t" anchorCtr="0">
-            <a:noAutofit/>
-          </a:bodyPr>
-          <a:lstStyle>
-            <a:lvl1pPr lvl="0">
-              <a:spcBef>
-                <a:spcPts val="0"/>
-              </a:spcBef>
-              <a:spcAft>
-                <a:spcPts val="0"/>
-              </a:spcAft>
-              <a:buSzPts val="2400"/>
-              <a:buNone/>
-              <a:defRPr sz="2400"/>
-            </a:lvl1pPr>
-            <a:lvl2pPr lvl="1">
-              <a:spcBef>
-                <a:spcPts val="0"/>
-              </a:spcBef>
-              <a:spcAft>
-                <a:spcPts val="0"/>
-              </a:spcAft>
-              <a:buSzPts val="2400"/>
-              <a:buNone/>
-              <a:defRPr sz="2400"/>
-            </a:lvl2pPr>
-            <a:lvl3pPr lvl="2">
-              <a:spcBef>
-                <a:spcPts val="0"/>
-              </a:spcBef>
-              <a:spcAft>
-                <a:spcPts val="0"/>
-              </a:spcAft>
-              <a:buSzPts val="2400"/>
-              <a:buNone/>
-              <a:defRPr sz="2400"/>
-            </a:lvl3pPr>
-            <a:lvl4pPr lvl="3">
-              <a:spcBef>
-                <a:spcPts val="0"/>
-              </a:spcBef>
-              <a:spcAft>
-                <a:spcPts val="0"/>
-              </a:spcAft>
-              <a:buSzPts val="2400"/>
-              <a:buNone/>
-              <a:defRPr sz="2400"/>
-            </a:lvl4pPr>
-            <a:lvl5pPr lvl="4">
-              <a:spcBef>
-                <a:spcPts val="0"/>
-              </a:spcBef>
-              <a:spcAft>
-                <a:spcPts val="0"/>
-              </a:spcAft>
-              <a:buSzPts val="2400"/>
-              <a:buNone/>
-              <a:defRPr sz="2400"/>
-            </a:lvl5pPr>
-            <a:lvl6pPr lvl="5">
-              <a:spcBef>
-                <a:spcPts val="0"/>
-              </a:spcBef>
-              <a:spcAft>
-                <a:spcPts val="0"/>
-              </a:spcAft>
-              <a:buSzPts val="2400"/>
-              <a:buNone/>
-              <a:defRPr sz="2400"/>
-            </a:lvl6pPr>
-            <a:lvl7pPr lvl="6">
-              <a:spcBef>
-                <a:spcPts val="0"/>
-              </a:spcBef>
-              <a:spcAft>
-                <a:spcPts val="0"/>
-              </a:spcAft>
-              <a:buSzPts val="2400"/>
-              <a:buNone/>
-              <a:defRPr sz="2400"/>
-            </a:lvl7pPr>
-            <a:lvl8pPr lvl="7">
-              <a:spcBef>
-                <a:spcPts val="0"/>
-              </a:spcBef>
-              <a:spcAft>
-                <a:spcPts val="0"/>
-              </a:spcAft>
-              <a:buSzPts val="2400"/>
-              <a:buNone/>
-              <a:defRPr sz="2400"/>
-            </a:lvl8pPr>
-            <a:lvl9pPr lvl="8">
-              <a:spcBef>
-                <a:spcPts val="0"/>
-              </a:spcBef>
-              <a:spcAft>
-                <a:spcPts val="0"/>
-              </a:spcAft>
-              <a:buSzPts val="2400"/>
-              <a:buNone/>
-              <a:defRPr sz="2400"/>
-            </a:lvl9pPr>
-          </a:lstStyle>
-          <a:p>
-            <a:endParaRPr/>
-          </a:p>
-        </p:txBody>
-      </p:sp>
-      <p:sp>
-        <p:nvSpPr>
-          <p:cNvPr id="61" name="Google Shape;61;p6"/>
-          <p:cNvSpPr txBox="1">
-            <a:spLocks noGrp="1"/>
-          </p:cNvSpPr>
-          <p:nvPr>
-            <p:ph type="sldNum" idx="12"/>
-          </p:nvPr>
-        </p:nvSpPr>
-        <p:spPr>
-          <a:xfrm>
-            <a:off x="8472458" y="4663217"/>
-            <a:ext cx="548700" cy="393600"/>
-          </a:xfrm>
-          <a:prstGeom prst="rect">
-            <a:avLst/>
-          </a:prstGeom>
-        </p:spPr>
-        <p:txBody>
-          <a:bodyPr spcFirstLastPara="1" wrap="square" lIns="91425" tIns="91425" rIns="91425" bIns="91425" anchor="ctr" anchorCtr="0">
-            <a:noAutofit/>
-          </a:bodyPr>
-          <a:lstStyle>
-            <a:lvl1pPr lvl="0">
-              <a:buNone/>
-              <a:defRPr/>
-            </a:lvl1pPr>
-            <a:lvl2pPr lvl="1">
-              <a:buNone/>
-              <a:defRPr/>
-            </a:lvl2pPr>
-            <a:lvl3pPr lvl="2">
-              <a:buNone/>
-              <a:defRPr/>
-            </a:lvl3pPr>
-            <a:lvl4pPr lvl="3">
-              <a:buNone/>
-              <a:defRPr/>
-            </a:lvl4pPr>
-            <a:lvl5pPr lvl="4">
-              <a:buNone/>
-              <a:defRPr/>
-            </a:lvl5pPr>
-            <a:lvl6pPr lvl="5">
-              <a:buNone/>
-              <a:defRPr/>
-            </a:lvl6pPr>
-            <a:lvl7pPr lvl="6">
-              <a:buNone/>
-              <a:defRPr/>
-            </a:lvl7pPr>
-            <a:lvl8pPr lvl="7">
-              <a:buNone/>
-              <a:defRPr/>
-            </a:lvl8pPr>
-            <a:lvl9pPr lvl="8">
-              <a:buNone/>
-              <a:defRPr/>
-            </a:lvl9pPr>
-          </a:lstStyle>
-          <a:p>
-            <a:pPr marL="0" lvl="0" indent="0" algn="r" rtl="0">
-              <a:spcBef>
-                <a:spcPts val="0"/>
-              </a:spcBef>
-              <a:spcAft>
-                <a:spcPts val="0"/>
-              </a:spcAft>
-              <a:buNone/>
-            </a:pPr>
-            <a:fld id="{00000000-1234-1234-1234-123412341234}" type="slidenum">
-              <a:rPr lang="en"/>
-              <a:t>‹#›</a:t>
-            </a:fld>
-            <a:endParaRPr/>
-          </a:p>
-        </p:txBody>
-      </p:sp>
-    </p:spTree>
-  </p:cSld>
-  <p:clrMapOvr>
-    <a:masterClrMapping/>
-  </p:clrMapOvr>
-</p:sldLayout>
-</file>
-
-<file path=ppt/slideLayouts/slideLayout6.xml><?xml version="1.0" encoding="utf-8"?>
 <p:sldLayout xmlns:a="http://schemas.openxmlformats.org/drawingml/2006/main" xmlns:r="http://schemas.openxmlformats.org/officeDocument/2006/relationships" xmlns:p="http://schemas.openxmlformats.org/presentationml/2006/main" matchingName="One column text">
   <p:cSld name="ONE_COLUMN_TEXT">
     <p:spTree>
@@ -7404,7 +7069,7 @@
 </p:sldLayout>
 </file>
 
-<file path=ppt/slideLayouts/slideLayout7.xml><?xml version="1.0" encoding="utf-8"?>
+<file path=ppt/slideLayouts/slideLayout6.xml><?xml version="1.0" encoding="utf-8"?>
 <p:sldLayout xmlns:a="http://schemas.openxmlformats.org/drawingml/2006/main" xmlns:r="http://schemas.openxmlformats.org/officeDocument/2006/relationships" xmlns:p="http://schemas.openxmlformats.org/presentationml/2006/main" matchingName="Section title and description">
   <p:cSld name="SECTION_TITLE_AND_DESCRIPTION">
     <p:spTree>
@@ -8021,7 +7686,7 @@
 </p:sldLayout>
 </file>
 
-<file path=ppt/slideLayouts/slideLayout8.xml><?xml version="1.0" encoding="utf-8"?>
+<file path=ppt/slideLayouts/slideLayout7.xml><?xml version="1.0" encoding="utf-8"?>
 <p:sldLayout xmlns:a="http://schemas.openxmlformats.org/drawingml/2006/main" xmlns:r="http://schemas.openxmlformats.org/officeDocument/2006/relationships" xmlns:p="http://schemas.openxmlformats.org/presentationml/2006/main" matchingName="Caption">
   <p:cSld name="CAPTION_ONLY">
     <p:spTree>
@@ -8272,7 +7937,7 @@
 </p:sldLayout>
 </file>
 
-<file path=ppt/slideLayouts/slideLayout9.xml><?xml version="1.0" encoding="utf-8"?>
+<file path=ppt/slideLayouts/slideLayout8.xml><?xml version="1.0" encoding="utf-8"?>
 <p:sldLayout xmlns:a="http://schemas.openxmlformats.org/drawingml/2006/main" xmlns:r="http://schemas.openxmlformats.org/officeDocument/2006/relationships" xmlns:p="http://schemas.openxmlformats.org/presentationml/2006/main" matchingName="Big number">
   <p:cSld name="BIG_NUMBER">
     <p:spTree>
@@ -9439,6 +9104,110 @@
 </p:sldLayout>
 </file>
 
+<file path=ppt/slideLayouts/slideLayout9.xml><?xml version="1.0" encoding="utf-8"?>
+<p:sldLayout xmlns:a="http://schemas.openxmlformats.org/drawingml/2006/main" xmlns:r="http://schemas.openxmlformats.org/officeDocument/2006/relationships" xmlns:p="http://schemas.openxmlformats.org/presentationml/2006/main" matchingName="Blank" type="blank">
+  <p:cSld name="BLANK">
+    <p:spTree>
+      <p:nvGrpSpPr>
+        <p:cNvPr id="1" name="Shape 128"/>
+        <p:cNvGrpSpPr/>
+        <p:nvPr/>
+      </p:nvGrpSpPr>
+      <p:grpSpPr>
+        <a:xfrm>
+          <a:off x="0" y="0"/>
+          <a:ext cx="0" cy="0"/>
+          <a:chOff x="0" y="0"/>
+          <a:chExt cx="0" cy="0"/>
+        </a:xfrm>
+      </p:grpSpPr>
+      <p:sp>
+        <p:nvSpPr>
+          <p:cNvPr id="129" name="Google Shape;129;p12"/>
+          <p:cNvSpPr txBox="1">
+            <a:spLocks noGrp="1"/>
+          </p:cNvSpPr>
+          <p:nvPr>
+            <p:ph type="sldNum" idx="12"/>
+          </p:nvPr>
+        </p:nvSpPr>
+        <p:spPr>
+          <a:xfrm>
+            <a:off x="8472458" y="4663217"/>
+            <a:ext cx="548700" cy="393600"/>
+          </a:xfrm>
+          <a:prstGeom prst="rect">
+            <a:avLst/>
+          </a:prstGeom>
+        </p:spPr>
+        <p:txBody>
+          <a:bodyPr spcFirstLastPara="1" wrap="square" lIns="91425" tIns="91425" rIns="91425" bIns="91425" anchor="ctr" anchorCtr="0">
+            <a:noAutofit/>
+          </a:bodyPr>
+          <a:lstStyle>
+            <a:lvl1pPr lvl="0">
+              <a:buNone/>
+              <a:defRPr/>
+            </a:lvl1pPr>
+            <a:lvl2pPr lvl="1">
+              <a:buNone/>
+              <a:defRPr/>
+            </a:lvl2pPr>
+            <a:lvl3pPr lvl="2">
+              <a:buNone/>
+              <a:defRPr/>
+            </a:lvl3pPr>
+            <a:lvl4pPr lvl="3">
+              <a:buNone/>
+              <a:defRPr/>
+            </a:lvl4pPr>
+            <a:lvl5pPr lvl="4">
+              <a:buNone/>
+              <a:defRPr/>
+            </a:lvl5pPr>
+            <a:lvl6pPr lvl="5">
+              <a:buNone/>
+              <a:defRPr/>
+            </a:lvl6pPr>
+            <a:lvl7pPr lvl="6">
+              <a:buNone/>
+              <a:defRPr/>
+            </a:lvl7pPr>
+            <a:lvl8pPr lvl="7">
+              <a:buNone/>
+              <a:defRPr/>
+            </a:lvl8pPr>
+            <a:lvl9pPr lvl="8">
+              <a:buNone/>
+              <a:defRPr/>
+            </a:lvl9pPr>
+          </a:lstStyle>
+          <a:p>
+            <a:pPr marL="0" lvl="0" indent="0" algn="r" rtl="0">
+              <a:spcBef>
+                <a:spcPts val="0"/>
+              </a:spcBef>
+              <a:spcAft>
+                <a:spcPts val="0"/>
+              </a:spcAft>
+              <a:buNone/>
+            </a:pPr>
+            <a:fld id="{00000000-1234-1234-1234-123412341234}" type="slidenum">
+              <a:rPr lang="en"/>
+              <a:t>‹#›</a:t>
+            </a:fld>
+            <a:endParaRPr/>
+          </a:p>
+        </p:txBody>
+      </p:sp>
+    </p:spTree>
+  </p:cSld>
+  <p:clrMapOvr>
+    <a:masterClrMapping/>
+  </p:clrMapOvr>
+</p:sldLayout>
+</file>
+
 <file path=ppt/slideMasters/slideMaster1.xml><?xml version="1.0" encoding="utf-8"?>
 <p:sldMaster xmlns:a="http://schemas.openxmlformats.org/drawingml/2006/main" xmlns:r="http://schemas.openxmlformats.org/officeDocument/2006/relationships" xmlns:p="http://schemas.openxmlformats.org/presentationml/2006/main">
   <p:cSld name="focus">
@@ -10136,12 +9905,11 @@
     <p:sldLayoutId id="2147483649" r:id="rId2"/>
     <p:sldLayoutId id="2147483650" r:id="rId3"/>
     <p:sldLayoutId id="2147483651" r:id="rId4"/>
-    <p:sldLayoutId id="2147483652" r:id="rId5"/>
-    <p:sldLayoutId id="2147483653" r:id="rId6"/>
-    <p:sldLayoutId id="2147483655" r:id="rId7"/>
-    <p:sldLayoutId id="2147483656" r:id="rId8"/>
-    <p:sldLayoutId id="2147483657" r:id="rId9"/>
-    <p:sldLayoutId id="2147483658" r:id="rId10"/>
+    <p:sldLayoutId id="2147483653" r:id="rId5"/>
+    <p:sldLayoutId id="2147483655" r:id="rId6"/>
+    <p:sldLayoutId id="2147483656" r:id="rId7"/>
+    <p:sldLayoutId id="2147483657" r:id="rId8"/>
+    <p:sldLayoutId id="2147483658" r:id="rId9"/>
   </p:sldLayoutIdLst>
   <p:hf sldNum="0" hdr="0" ftr="0" dt="0"/>
   <p:txStyles>
@@ -11235,7 +11003,7 @@
       </p:sp>
       <p:pic>
         <p:nvPicPr>
-          <p:cNvPr id="6" name="Picture 5" descr="A screenshot of a cell phone&#10;&#10;Description automatically generated">
+          <p:cNvPr id="6" name="Picture 5">
             <a:extLst>
               <a:ext uri="{FF2B5EF4-FFF2-40B4-BE49-F238E27FC236}">
                 <a16:creationId xmlns:a16="http://schemas.microsoft.com/office/drawing/2014/main" id="{989991AD-A38C-44E1-8ECB-85D070481B7B}"/>
@@ -11247,15 +11015,15 @@
           </p:cNvPicPr>
           <p:nvPr/>
         </p:nvPicPr>
-        <p:blipFill rotWithShape="1">
+        <p:blipFill>
           <a:blip r:embed="rId3"/>
-          <a:srcRect b="20163"/>
+          <a:srcRect/>
           <a:stretch/>
         </p:blipFill>
         <p:spPr>
           <a:xfrm>
-            <a:off x="1192088" y="198967"/>
-            <a:ext cx="6759823" cy="4106408"/>
+            <a:off x="1192088" y="441889"/>
+            <a:ext cx="6759823" cy="3620564"/>
           </a:xfrm>
           <a:prstGeom prst="rect">
             <a:avLst/>
@@ -11346,8 +11114,8 @@
         </p:blipFill>
         <p:spPr>
           <a:xfrm>
-            <a:off x="1192088" y="771892"/>
-            <a:ext cx="6759823" cy="2960558"/>
+            <a:off x="1192088" y="813835"/>
+            <a:ext cx="6759823" cy="2876672"/>
           </a:xfrm>
           <a:prstGeom prst="rect">
             <a:avLst/>
@@ -11489,10 +11257,6 @@
           </p:nvPr>
         </p:nvSpPr>
         <p:spPr>
-          <a:xfrm>
-            <a:off x="1297500" y="393750"/>
-            <a:ext cx="7038900" cy="914100"/>
-          </a:xfrm>
           <a:prstGeom prst="rect">
             <a:avLst/>
           </a:prstGeom>
@@ -11528,7 +11292,262 @@
           </a:p>
         </p:txBody>
       </p:sp>
+      <p:sp>
+        <p:nvSpPr>
+          <p:cNvPr id="2" name="Text Placeholder 1">
+            <a:extLst>
+              <a:ext uri="{FF2B5EF4-FFF2-40B4-BE49-F238E27FC236}">
+                <a16:creationId xmlns:a16="http://schemas.microsoft.com/office/drawing/2014/main" id="{30FF6593-E85F-44B6-B1E0-4DE32AB67789}"/>
+              </a:ext>
+            </a:extLst>
+          </p:cNvPr>
+          <p:cNvSpPr>
+            <a:spLocks noGrp="1"/>
+          </p:cNvSpPr>
+          <p:nvPr>
+            <p:ph type="body" idx="1"/>
+          </p:nvPr>
+        </p:nvSpPr>
+        <p:spPr>
+          <a:xfrm>
+            <a:off x="1052539" y="1567550"/>
+            <a:ext cx="3403200" cy="2911200"/>
+          </a:xfrm>
+        </p:spPr>
+        <p:txBody>
+          <a:bodyPr/>
+          <a:lstStyle/>
+          <a:p>
+            <a:pPr marL="146050" indent="0" algn="ctr">
+              <a:buNone/>
+            </a:pPr>
+            <a:r>
+              <a:rPr lang="en-US" sz="1600" dirty="0"/>
+              <a:t>Logistic Regression Model: </a:t>
+            </a:r>
+          </a:p>
+          <a:p>
+            <a:pPr marL="146050" indent="0" algn="ctr">
+              <a:buNone/>
+            </a:pPr>
+            <a:r>
+              <a:rPr lang="en-US" sz="1600" dirty="0"/>
+              <a:t>Popular Tags</a:t>
+            </a:r>
+          </a:p>
+        </p:txBody>
+      </p:sp>
+      <p:sp>
+        <p:nvSpPr>
+          <p:cNvPr id="3" name="Text Placeholder 2">
+            <a:extLst>
+              <a:ext uri="{FF2B5EF4-FFF2-40B4-BE49-F238E27FC236}">
+                <a16:creationId xmlns:a16="http://schemas.microsoft.com/office/drawing/2014/main" id="{CEEC5741-8082-4051-99C3-8094AB8595E7}"/>
+              </a:ext>
+            </a:extLst>
+          </p:cNvPr>
+          <p:cNvSpPr>
+            <a:spLocks noGrp="1"/>
+          </p:cNvSpPr>
+          <p:nvPr>
+            <p:ph type="body" idx="2"/>
+          </p:nvPr>
+        </p:nvSpPr>
+        <p:spPr>
+          <a:xfrm>
+            <a:off x="5178181" y="1567550"/>
+            <a:ext cx="3403200" cy="2911200"/>
+          </a:xfrm>
+        </p:spPr>
+        <p:txBody>
+          <a:bodyPr/>
+          <a:lstStyle/>
+          <a:p>
+            <a:pPr marL="146050" indent="0" algn="ctr">
+              <a:buNone/>
+            </a:pPr>
+            <a:r>
+              <a:rPr lang="en-US" sz="1600" dirty="0"/>
+              <a:t>Logistic Regression Model: </a:t>
+            </a:r>
+          </a:p>
+          <a:p>
+            <a:pPr marL="146050" indent="0" algn="ctr">
+              <a:buNone/>
+            </a:pPr>
+            <a:r>
+              <a:rPr lang="en-US" sz="1600" dirty="0"/>
+              <a:t>Genre</a:t>
+            </a:r>
+          </a:p>
+        </p:txBody>
+      </p:sp>
+      <p:pic>
+        <p:nvPicPr>
+          <p:cNvPr id="5" name="Picture 4" descr="A screenshot of a cell phone&#10;&#10;Description automatically generated">
+            <a:extLst>
+              <a:ext uri="{FF2B5EF4-FFF2-40B4-BE49-F238E27FC236}">
+                <a16:creationId xmlns:a16="http://schemas.microsoft.com/office/drawing/2014/main" id="{EFFE21E3-8A7B-48DE-AE19-1FD2002FFFE2}"/>
+              </a:ext>
+            </a:extLst>
+          </p:cNvPr>
+          <p:cNvPicPr>
+            <a:picLocks noChangeAspect="1"/>
+          </p:cNvPicPr>
+          <p:nvPr/>
+        </p:nvPicPr>
+        <p:blipFill>
+          <a:blip r:embed="rId3"/>
+          <a:stretch>
+            <a:fillRect/>
+          </a:stretch>
+        </p:blipFill>
+        <p:spPr>
+          <a:xfrm>
+            <a:off x="807579" y="2571750"/>
+            <a:ext cx="3893121" cy="1285324"/>
+          </a:xfrm>
+          <a:prstGeom prst="rect">
+            <a:avLst/>
+          </a:prstGeom>
+        </p:spPr>
+      </p:pic>
+      <p:pic>
+        <p:nvPicPr>
+          <p:cNvPr id="7" name="Picture 6" descr="A picture containing clock&#10;&#10;Description automatically generated">
+            <a:extLst>
+              <a:ext uri="{FF2B5EF4-FFF2-40B4-BE49-F238E27FC236}">
+                <a16:creationId xmlns:a16="http://schemas.microsoft.com/office/drawing/2014/main" id="{8B349BE9-4EEF-471A-B9D6-0386124AB32F}"/>
+              </a:ext>
+            </a:extLst>
+          </p:cNvPr>
+          <p:cNvPicPr>
+            <a:picLocks noChangeAspect="1"/>
+          </p:cNvPicPr>
+          <p:nvPr/>
+        </p:nvPicPr>
+        <p:blipFill>
+          <a:blip r:embed="rId4"/>
+          <a:stretch>
+            <a:fillRect/>
+          </a:stretch>
+        </p:blipFill>
+        <p:spPr>
+          <a:xfrm>
+            <a:off x="4933221" y="2571750"/>
+            <a:ext cx="3893121" cy="1292638"/>
+          </a:xfrm>
+          <a:prstGeom prst="rect">
+            <a:avLst/>
+          </a:prstGeom>
+        </p:spPr>
+      </p:pic>
+      <p:sp>
+        <p:nvSpPr>
+          <p:cNvPr id="8" name="Rectangle 7">
+            <a:extLst>
+              <a:ext uri="{FF2B5EF4-FFF2-40B4-BE49-F238E27FC236}">
+                <a16:creationId xmlns:a16="http://schemas.microsoft.com/office/drawing/2014/main" id="{598D9218-BEA1-48EB-9CF8-6ADFFACB0773}"/>
+              </a:ext>
+            </a:extLst>
+          </p:cNvPr>
+          <p:cNvSpPr/>
+          <p:nvPr/>
+        </p:nvSpPr>
+        <p:spPr>
+          <a:xfrm>
+            <a:off x="3252788" y="3252788"/>
+            <a:ext cx="366713" cy="157163"/>
+          </a:xfrm>
+          <a:prstGeom prst="rect">
+            <a:avLst/>
+          </a:prstGeom>
+          <a:noFill/>
+          <a:ln>
+            <a:solidFill>
+              <a:srgbClr val="FF0000"/>
+            </a:solidFill>
+          </a:ln>
+        </p:spPr>
+        <p:style>
+          <a:lnRef idx="2">
+            <a:schemeClr val="accent6"/>
+          </a:lnRef>
+          <a:fillRef idx="1">
+            <a:schemeClr val="lt1"/>
+          </a:fillRef>
+          <a:effectRef idx="0">
+            <a:schemeClr val="accent6"/>
+          </a:effectRef>
+          <a:fontRef idx="minor">
+            <a:schemeClr val="dk1"/>
+          </a:fontRef>
+        </p:style>
+        <p:txBody>
+          <a:bodyPr rtlCol="0" anchor="ctr"/>
+          <a:lstStyle/>
+          <a:p>
+            <a:pPr algn="ctr"/>
+            <a:endParaRPr lang="en-US"/>
+          </a:p>
+        </p:txBody>
+      </p:sp>
+      <p:sp>
+        <p:nvSpPr>
+          <p:cNvPr id="10" name="Rectangle 9">
+            <a:extLst>
+              <a:ext uri="{FF2B5EF4-FFF2-40B4-BE49-F238E27FC236}">
+                <a16:creationId xmlns:a16="http://schemas.microsoft.com/office/drawing/2014/main" id="{541F93D6-E6C4-431F-8DFD-69CEF332BB9A}"/>
+              </a:ext>
+            </a:extLst>
+          </p:cNvPr>
+          <p:cNvSpPr/>
+          <p:nvPr/>
+        </p:nvSpPr>
+        <p:spPr>
+          <a:xfrm>
+            <a:off x="7439025" y="3262314"/>
+            <a:ext cx="366713" cy="157163"/>
+          </a:xfrm>
+          <a:prstGeom prst="rect">
+            <a:avLst/>
+          </a:prstGeom>
+          <a:noFill/>
+          <a:ln>
+            <a:solidFill>
+              <a:srgbClr val="FF0000"/>
+            </a:solidFill>
+          </a:ln>
+        </p:spPr>
+        <p:style>
+          <a:lnRef idx="2">
+            <a:schemeClr val="accent6"/>
+          </a:lnRef>
+          <a:fillRef idx="1">
+            <a:schemeClr val="lt1"/>
+          </a:fillRef>
+          <a:effectRef idx="0">
+            <a:schemeClr val="accent6"/>
+          </a:effectRef>
+          <a:fontRef idx="minor">
+            <a:schemeClr val="dk1"/>
+          </a:fontRef>
+        </p:style>
+        <p:txBody>
+          <a:bodyPr rtlCol="0" anchor="ctr"/>
+          <a:lstStyle/>
+          <a:p>
+            <a:pPr algn="ctr"/>
+            <a:endParaRPr lang="en-US"/>
+          </a:p>
+        </p:txBody>
+      </p:sp>
     </p:spTree>
+    <p:extLst>
+      <p:ext uri="{BB962C8B-B14F-4D97-AF65-F5344CB8AC3E}">
+        <p14:creationId xmlns:p14="http://schemas.microsoft.com/office/powerpoint/2010/main" val="68196795"/>
+      </p:ext>
+    </p:extLst>
   </p:cSld>
   <p:clrMapOvr>
     <a:masterClrMapping/>
@@ -11885,10 +11904,10 @@
               <a:buNone/>
             </a:pPr>
             <a:r>
-              <a:rPr lang="en"/>
+              <a:rPr lang="en" dirty="0"/>
               <a:t>We began exploring project topics with eSports, for there was a lot of data available within the video game industry.</a:t>
             </a:r>
-            <a:endParaRPr/>
+            <a:endParaRPr dirty="0"/>
           </a:p>
           <a:p>
             <a:pPr marL="0" lvl="0" indent="0" algn="l" rtl="0">
@@ -11901,10 +11920,25 @@
               <a:buNone/>
             </a:pPr>
             <a:r>
-              <a:rPr lang="en"/>
-              <a:t>As we explored different areas, we came upon the questions of how did video games get so big? The industry has grown exponentially and there are many types of games available. </a:t>
-            </a:r>
-            <a:endParaRPr/>
+              <a:rPr lang="en" dirty="0"/>
+              <a:t>As we explored different areas, we came upon the questions of how did video games get so big? </a:t>
+            </a:r>
+          </a:p>
+          <a:p>
+            <a:pPr marL="0" lvl="0" indent="0" algn="l" rtl="0">
+              <a:spcBef>
+                <a:spcPts val="1600"/>
+              </a:spcBef>
+              <a:spcAft>
+                <a:spcPts val="1600"/>
+              </a:spcAft>
+              <a:buNone/>
+            </a:pPr>
+            <a:r>
+              <a:rPr lang="en" dirty="0"/>
+              <a:t>The industry has grown exponentially and there are many types of games available. </a:t>
+            </a:r>
+            <a:endParaRPr dirty="0"/>
           </a:p>
         </p:txBody>
       </p:sp>
@@ -12054,10 +12088,10 @@
               <a:buNone/>
             </a:pPr>
             <a:r>
-              <a:rPr lang="en"/>
+              <a:rPr lang="en" dirty="0"/>
               <a:t>Topic Selection</a:t>
             </a:r>
-            <a:endParaRPr/>
+            <a:endParaRPr dirty="0"/>
           </a:p>
         </p:txBody>
       </p:sp>
@@ -12073,7 +12107,7 @@
         </p:nvSpPr>
         <p:spPr>
           <a:xfrm>
-            <a:off x="1297500" y="1567550"/>
+            <a:off x="1297500" y="1460250"/>
             <a:ext cx="3403200" cy="2911200"/>
           </a:xfrm>
           <a:prstGeom prst="rect">
@@ -12096,14 +12130,41 @@
               <a:buNone/>
             </a:pPr>
             <a:r>
-              <a:rPr lang="en"/>
-              <a:t>Our topic was further narrowed down to figuring out what makes a video game popular. There are many features to focus on, such as the platform, type of game-play, genre, and various other categories. </a:t>
-            </a:r>
-            <a:endParaRPr/>
+              <a:rPr lang="en" dirty="0"/>
+              <a:t>Our topic was further narrowed down to figuring out what makes a video game popular. </a:t>
+            </a:r>
           </a:p>
           <a:p>
             <a:pPr marL="0" lvl="0" indent="0" algn="l" rtl="0">
               <a:spcBef>
+                <a:spcPts val="0"/>
+              </a:spcBef>
+              <a:spcAft>
+                <a:spcPts val="0"/>
+              </a:spcAft>
+              <a:buNone/>
+            </a:pPr>
+            <a:endParaRPr lang="en" dirty="0"/>
+          </a:p>
+          <a:p>
+            <a:pPr marL="0" lvl="0" indent="0" algn="l" rtl="0">
+              <a:spcBef>
+                <a:spcPts val="0"/>
+              </a:spcBef>
+              <a:spcAft>
+                <a:spcPts val="0"/>
+              </a:spcAft>
+              <a:buNone/>
+            </a:pPr>
+            <a:r>
+              <a:rPr lang="en" dirty="0"/>
+              <a:t>There are many features to focus on, such as the platform, type of game-play, genre, and various other categories. </a:t>
+            </a:r>
+            <a:endParaRPr dirty="0"/>
+          </a:p>
+          <a:p>
+            <a:pPr marL="0" lvl="0" indent="0" algn="l" rtl="0">
+              <a:spcBef>
                 <a:spcPts val="1600"/>
               </a:spcBef>
               <a:spcAft>
@@ -12112,10 +12173,10 @@
               <a:buNone/>
             </a:pPr>
             <a:r>
-              <a:rPr lang="en"/>
+              <a:rPr lang="en" dirty="0"/>
               <a:t>By analyzing this data, it would help potential clients pick which creators to support, or help with decisions among their own creative teams to create a successful and popular video game.  </a:t>
             </a:r>
-            <a:endParaRPr/>
+            <a:endParaRPr dirty="0"/>
           </a:p>
         </p:txBody>
       </p:sp>

</xml_diff>